<commit_message>
Update card instruction and presentation
</commit_message>
<xml_diff>
--- a/Presentation/Final Presentation Online ver.pptx
+++ b/Presentation/Final Presentation Online ver.pptx
@@ -332,7 +332,7 @@
           <a:p>
             <a:fld id="{0D7C75F8-7AE9-9244-A398-42267B2B5DD4}" type="datetimeFigureOut">
               <a:rPr lang="en-US" smtClean="0"/>
-              <a:t>7/20/2022</a:t>
+              <a:t>7/21/2022</a:t>
             </a:fld>
             <a:endParaRPr lang="en-US"/>
           </a:p>
@@ -530,7 +530,7 @@
           <a:p>
             <a:fld id="{0D7C75F8-7AE9-9244-A398-42267B2B5DD4}" type="datetimeFigureOut">
               <a:rPr lang="en-US" smtClean="0"/>
-              <a:t>7/20/2022</a:t>
+              <a:t>7/21/2022</a:t>
             </a:fld>
             <a:endParaRPr lang="en-US"/>
           </a:p>
@@ -738,7 +738,7 @@
           <a:p>
             <a:fld id="{0D7C75F8-7AE9-9244-A398-42267B2B5DD4}" type="datetimeFigureOut">
               <a:rPr lang="en-US" smtClean="0"/>
-              <a:t>7/20/2022</a:t>
+              <a:t>7/21/2022</a:t>
             </a:fld>
             <a:endParaRPr lang="en-US"/>
           </a:p>
@@ -936,7 +936,7 @@
           <a:p>
             <a:fld id="{0D7C75F8-7AE9-9244-A398-42267B2B5DD4}" type="datetimeFigureOut">
               <a:rPr lang="en-US" smtClean="0"/>
-              <a:t>7/20/2022</a:t>
+              <a:t>7/21/2022</a:t>
             </a:fld>
             <a:endParaRPr lang="en-US"/>
           </a:p>
@@ -1211,7 +1211,7 @@
           <a:p>
             <a:fld id="{0D7C75F8-7AE9-9244-A398-42267B2B5DD4}" type="datetimeFigureOut">
               <a:rPr lang="en-US" smtClean="0"/>
-              <a:t>7/20/2022</a:t>
+              <a:t>7/21/2022</a:t>
             </a:fld>
             <a:endParaRPr lang="en-US"/>
           </a:p>
@@ -1476,7 +1476,7 @@
           <a:p>
             <a:fld id="{0D7C75F8-7AE9-9244-A398-42267B2B5DD4}" type="datetimeFigureOut">
               <a:rPr lang="en-US" smtClean="0"/>
-              <a:t>7/20/2022</a:t>
+              <a:t>7/21/2022</a:t>
             </a:fld>
             <a:endParaRPr lang="en-US"/>
           </a:p>
@@ -1888,7 +1888,7 @@
           <a:p>
             <a:fld id="{0D7C75F8-7AE9-9244-A398-42267B2B5DD4}" type="datetimeFigureOut">
               <a:rPr lang="en-US" smtClean="0"/>
-              <a:t>7/20/2022</a:t>
+              <a:t>7/21/2022</a:t>
             </a:fld>
             <a:endParaRPr lang="en-US"/>
           </a:p>
@@ -2029,7 +2029,7 @@
           <a:p>
             <a:fld id="{0D7C75F8-7AE9-9244-A398-42267B2B5DD4}" type="datetimeFigureOut">
               <a:rPr lang="en-US" smtClean="0"/>
-              <a:t>7/20/2022</a:t>
+              <a:t>7/21/2022</a:t>
             </a:fld>
             <a:endParaRPr lang="en-US"/>
           </a:p>
@@ -2142,7 +2142,7 @@
           <a:p>
             <a:fld id="{0D7C75F8-7AE9-9244-A398-42267B2B5DD4}" type="datetimeFigureOut">
               <a:rPr lang="en-US" smtClean="0"/>
-              <a:t>7/20/2022</a:t>
+              <a:t>7/21/2022</a:t>
             </a:fld>
             <a:endParaRPr lang="en-US"/>
           </a:p>
@@ -2453,7 +2453,7 @@
           <a:p>
             <a:fld id="{0D7C75F8-7AE9-9244-A398-42267B2B5DD4}" type="datetimeFigureOut">
               <a:rPr lang="en-US" smtClean="0"/>
-              <a:t>7/20/2022</a:t>
+              <a:t>7/21/2022</a:t>
             </a:fld>
             <a:endParaRPr lang="en-US"/>
           </a:p>
@@ -2741,7 +2741,7 @@
           <a:p>
             <a:fld id="{0D7C75F8-7AE9-9244-A398-42267B2B5DD4}" type="datetimeFigureOut">
               <a:rPr lang="en-US" smtClean="0"/>
-              <a:t>7/20/2022</a:t>
+              <a:t>7/21/2022</a:t>
             </a:fld>
             <a:endParaRPr lang="en-US"/>
           </a:p>
@@ -2982,7 +2982,7 @@
           <a:p>
             <a:fld id="{0D7C75F8-7AE9-9244-A398-42267B2B5DD4}" type="datetimeFigureOut">
               <a:rPr lang="en-US" smtClean="0"/>
-              <a:t>7/20/2022</a:t>
+              <a:t>7/21/2022</a:t>
             </a:fld>
             <a:endParaRPr lang="en-US"/>
           </a:p>
@@ -9685,8 +9685,8 @@
         </p:nvSpPr>
         <p:spPr>
           <a:xfrm>
-            <a:off x="934293" y="2736503"/>
-            <a:ext cx="4412407" cy="1384995"/>
+            <a:off x="576261" y="2480637"/>
+            <a:ext cx="5001370" cy="3108543"/>
           </a:xfrm>
           <a:prstGeom prst="rect">
             <a:avLst/>
@@ -9713,7 +9713,7 @@
             </a:pPr>
             <a:r>
               <a:rPr lang="en-GB" sz="2800" b="1" dirty="0"/>
-              <a:t>You can have 2 Cards</a:t>
+              <a:t>You can have up to 2 Cards, and use any of them at will</a:t>
             </a:r>
           </a:p>
           <a:p>
@@ -9722,51 +9722,38 @@
             </a:pPr>
             <a:r>
               <a:rPr lang="en-US" altLang="zh-CN" sz="2800" b="1" dirty="0"/>
-              <a:t>Collectible card</a:t>
-            </a:r>
-            <a:endParaRPr lang="en-GB" sz="2800" b="1" dirty="0"/>
+              <a:t>A lot of Collectible cards</a:t>
+            </a:r>
+          </a:p>
+          <a:p>
+            <a:endParaRPr lang="en-US" altLang="zh-CN" sz="2800" b="1" dirty="0"/>
+          </a:p>
+          <a:p>
+            <a:r>
+              <a:rPr lang="en-US" altLang="zh-CN" sz="2800" b="1" dirty="0"/>
+              <a:t>Principle:</a:t>
+            </a:r>
+          </a:p>
+          <a:p>
+            <a:r>
+              <a:rPr lang="en-GB" sz="2800" b="1" dirty="0"/>
+              <a:t>Higher </a:t>
+            </a:r>
+            <a:r>
+              <a:rPr lang="en-US" altLang="zh-CN" sz="2800" b="1" dirty="0"/>
+              <a:t>R</a:t>
+            </a:r>
+            <a:r>
+              <a:rPr lang="en-GB" sz="2800" b="1" dirty="0" err="1"/>
+              <a:t>isk</a:t>
+            </a:r>
+            <a:r>
+              <a:rPr lang="en-GB" sz="2800" b="1" dirty="0"/>
+              <a:t> Higher Return</a:t>
+            </a:r>
           </a:p>
         </p:txBody>
       </p:sp>
-      <p:pic>
-        <p:nvPicPr>
-          <p:cNvPr id="12" name="Picture 11">
-            <a:extLst>
-              <a:ext uri="{FF2B5EF4-FFF2-40B4-BE49-F238E27FC236}">
-                <a16:creationId xmlns:a16="http://schemas.microsoft.com/office/drawing/2014/main" id="{2ED2AD2B-46C7-05DE-D43C-BA0DCACBE7F5}"/>
-              </a:ext>
-            </a:extLst>
-          </p:cNvPr>
-          <p:cNvPicPr>
-            <a:picLocks noChangeAspect="1"/>
-          </p:cNvPicPr>
-          <p:nvPr/>
-        </p:nvPicPr>
-        <p:blipFill rotWithShape="1">
-          <a:blip r:embed="rId3"/>
-          <a:srcRect b="2496"/>
-          <a:stretch/>
-        </p:blipFill>
-        <p:spPr>
-          <a:xfrm>
-            <a:off x="5658296" y="3614478"/>
-            <a:ext cx="5081885" cy="2706071"/>
-          </a:xfrm>
-          <a:prstGeom prst="rect">
-            <a:avLst/>
-          </a:prstGeom>
-          <a:ln>
-            <a:noFill/>
-          </a:ln>
-          <a:effectLst>
-            <a:outerShdw blurRad="190500" algn="tl" rotWithShape="0">
-              <a:srgbClr val="000000">
-                <a:alpha val="70000"/>
-              </a:srgbClr>
-            </a:outerShdw>
-          </a:effectLst>
-        </p:spPr>
-      </p:pic>
       <p:sp>
         <p:nvSpPr>
           <p:cNvPr id="13" name="Title 1">
@@ -9823,6 +9810,46 @@
           </a:p>
         </p:txBody>
       </p:sp>
+      <p:pic>
+        <p:nvPicPr>
+          <p:cNvPr id="5" name="图片 4">
+            <a:extLst>
+              <a:ext uri="{FF2B5EF4-FFF2-40B4-BE49-F238E27FC236}">
+                <a16:creationId xmlns:a16="http://schemas.microsoft.com/office/drawing/2014/main" id="{0A30C4C9-A9F9-A1EF-9C24-F96E6D0B054B}"/>
+              </a:ext>
+            </a:extLst>
+          </p:cNvPr>
+          <p:cNvPicPr>
+            <a:picLocks noChangeAspect="1"/>
+          </p:cNvPicPr>
+          <p:nvPr/>
+        </p:nvPicPr>
+        <p:blipFill>
+          <a:blip r:embed="rId3"/>
+          <a:stretch>
+            <a:fillRect/>
+          </a:stretch>
+        </p:blipFill>
+        <p:spPr>
+          <a:xfrm>
+            <a:off x="5621965" y="3705620"/>
+            <a:ext cx="5162550" cy="2706072"/>
+          </a:xfrm>
+          <a:prstGeom prst="rect">
+            <a:avLst/>
+          </a:prstGeom>
+          <a:ln>
+            <a:noFill/>
+          </a:ln>
+          <a:effectLst>
+            <a:outerShdw blurRad="190500" algn="tl" rotWithShape="0">
+              <a:srgbClr val="000000">
+                <a:alpha val="70000"/>
+              </a:srgbClr>
+            </a:outerShdw>
+          </a:effectLst>
+        </p:spPr>
+      </p:pic>
       <p:sp>
         <p:nvSpPr>
           <p:cNvPr id="14" name="Rectangle 13">
@@ -9837,7 +9864,7 @@
         </p:nvSpPr>
         <p:spPr>
           <a:xfrm>
-            <a:off x="6578599" y="4034910"/>
+            <a:off x="7198800" y="4623306"/>
             <a:ext cx="1774029" cy="1489594"/>
           </a:xfrm>
           <a:prstGeom prst="rect">

</xml_diff>

<commit_message>
fixed instruction trigger position"
</commit_message>
<xml_diff>
--- a/Presentation/Final Presentation Online ver.pptx
+++ b/Presentation/Final Presentation Online ver.pptx
@@ -332,7 +332,7 @@
           <a:p>
             <a:fld id="{0D7C75F8-7AE9-9244-A398-42267B2B5DD4}" type="datetimeFigureOut">
               <a:rPr lang="en-US" smtClean="0"/>
-              <a:t>7/21/2022</a:t>
+              <a:t>7/20/2022</a:t>
             </a:fld>
             <a:endParaRPr lang="en-US"/>
           </a:p>
@@ -530,7 +530,7 @@
           <a:p>
             <a:fld id="{0D7C75F8-7AE9-9244-A398-42267B2B5DD4}" type="datetimeFigureOut">
               <a:rPr lang="en-US" smtClean="0"/>
-              <a:t>7/21/2022</a:t>
+              <a:t>7/20/2022</a:t>
             </a:fld>
             <a:endParaRPr lang="en-US"/>
           </a:p>
@@ -738,7 +738,7 @@
           <a:p>
             <a:fld id="{0D7C75F8-7AE9-9244-A398-42267B2B5DD4}" type="datetimeFigureOut">
               <a:rPr lang="en-US" smtClean="0"/>
-              <a:t>7/21/2022</a:t>
+              <a:t>7/20/2022</a:t>
             </a:fld>
             <a:endParaRPr lang="en-US"/>
           </a:p>
@@ -936,7 +936,7 @@
           <a:p>
             <a:fld id="{0D7C75F8-7AE9-9244-A398-42267B2B5DD4}" type="datetimeFigureOut">
               <a:rPr lang="en-US" smtClean="0"/>
-              <a:t>7/21/2022</a:t>
+              <a:t>7/20/2022</a:t>
             </a:fld>
             <a:endParaRPr lang="en-US"/>
           </a:p>
@@ -1211,7 +1211,7 @@
           <a:p>
             <a:fld id="{0D7C75F8-7AE9-9244-A398-42267B2B5DD4}" type="datetimeFigureOut">
               <a:rPr lang="en-US" smtClean="0"/>
-              <a:t>7/21/2022</a:t>
+              <a:t>7/20/2022</a:t>
             </a:fld>
             <a:endParaRPr lang="en-US"/>
           </a:p>
@@ -1476,7 +1476,7 @@
           <a:p>
             <a:fld id="{0D7C75F8-7AE9-9244-A398-42267B2B5DD4}" type="datetimeFigureOut">
               <a:rPr lang="en-US" smtClean="0"/>
-              <a:t>7/21/2022</a:t>
+              <a:t>7/20/2022</a:t>
             </a:fld>
             <a:endParaRPr lang="en-US"/>
           </a:p>
@@ -1888,7 +1888,7 @@
           <a:p>
             <a:fld id="{0D7C75F8-7AE9-9244-A398-42267B2B5DD4}" type="datetimeFigureOut">
               <a:rPr lang="en-US" smtClean="0"/>
-              <a:t>7/21/2022</a:t>
+              <a:t>7/20/2022</a:t>
             </a:fld>
             <a:endParaRPr lang="en-US"/>
           </a:p>
@@ -2029,7 +2029,7 @@
           <a:p>
             <a:fld id="{0D7C75F8-7AE9-9244-A398-42267B2B5DD4}" type="datetimeFigureOut">
               <a:rPr lang="en-US" smtClean="0"/>
-              <a:t>7/21/2022</a:t>
+              <a:t>7/20/2022</a:t>
             </a:fld>
             <a:endParaRPr lang="en-US"/>
           </a:p>
@@ -2142,7 +2142,7 @@
           <a:p>
             <a:fld id="{0D7C75F8-7AE9-9244-A398-42267B2B5DD4}" type="datetimeFigureOut">
               <a:rPr lang="en-US" smtClean="0"/>
-              <a:t>7/21/2022</a:t>
+              <a:t>7/20/2022</a:t>
             </a:fld>
             <a:endParaRPr lang="en-US"/>
           </a:p>
@@ -2453,7 +2453,7 @@
           <a:p>
             <a:fld id="{0D7C75F8-7AE9-9244-A398-42267B2B5DD4}" type="datetimeFigureOut">
               <a:rPr lang="en-US" smtClean="0"/>
-              <a:t>7/21/2022</a:t>
+              <a:t>7/20/2022</a:t>
             </a:fld>
             <a:endParaRPr lang="en-US"/>
           </a:p>
@@ -2741,7 +2741,7 @@
           <a:p>
             <a:fld id="{0D7C75F8-7AE9-9244-A398-42267B2B5DD4}" type="datetimeFigureOut">
               <a:rPr lang="en-US" smtClean="0"/>
-              <a:t>7/21/2022</a:t>
+              <a:t>7/20/2022</a:t>
             </a:fld>
             <a:endParaRPr lang="en-US"/>
           </a:p>
@@ -2982,7 +2982,7 @@
           <a:p>
             <a:fld id="{0D7C75F8-7AE9-9244-A398-42267B2B5DD4}" type="datetimeFigureOut">
               <a:rPr lang="en-US" smtClean="0"/>
-              <a:t>7/21/2022</a:t>
+              <a:t>7/20/2022</a:t>
             </a:fld>
             <a:endParaRPr lang="en-US"/>
           </a:p>
@@ -9685,8 +9685,8 @@
         </p:nvSpPr>
         <p:spPr>
           <a:xfrm>
-            <a:off x="576261" y="2480637"/>
-            <a:ext cx="5001370" cy="3108543"/>
+            <a:off x="934293" y="2736503"/>
+            <a:ext cx="4412407" cy="1384995"/>
           </a:xfrm>
           <a:prstGeom prst="rect">
             <a:avLst/>
@@ -9713,7 +9713,7 @@
             </a:pPr>
             <a:r>
               <a:rPr lang="en-GB" sz="2800" b="1" dirty="0"/>
-              <a:t>You can have up to 2 Cards, and use any of them at will</a:t>
+              <a:t>You can have 2 Cards</a:t>
             </a:r>
           </a:p>
           <a:p>
@@ -9722,38 +9722,51 @@
             </a:pPr>
             <a:r>
               <a:rPr lang="en-US" altLang="zh-CN" sz="2800" b="1" dirty="0"/>
-              <a:t>A lot of Collectible cards</a:t>
+              <a:t>Collectible card</a:t>
             </a:r>
-          </a:p>
-          <a:p>
-            <a:endParaRPr lang="en-US" altLang="zh-CN" sz="2800" b="1" dirty="0"/>
-          </a:p>
-          <a:p>
-            <a:r>
-              <a:rPr lang="en-US" altLang="zh-CN" sz="2800" b="1" dirty="0"/>
-              <a:t>Principle:</a:t>
-            </a:r>
-          </a:p>
-          <a:p>
-            <a:r>
-              <a:rPr lang="en-GB" sz="2800" b="1" dirty="0"/>
-              <a:t>Higher </a:t>
-            </a:r>
-            <a:r>
-              <a:rPr lang="en-US" altLang="zh-CN" sz="2800" b="1" dirty="0"/>
-              <a:t>R</a:t>
-            </a:r>
-            <a:r>
-              <a:rPr lang="en-GB" sz="2800" b="1" dirty="0" err="1"/>
-              <a:t>isk</a:t>
-            </a:r>
-            <a:r>
-              <a:rPr lang="en-GB" sz="2800" b="1" dirty="0"/>
-              <a:t> Higher Return</a:t>
-            </a:r>
+            <a:endParaRPr lang="en-GB" sz="2800" b="1" dirty="0"/>
           </a:p>
         </p:txBody>
       </p:sp>
+      <p:pic>
+        <p:nvPicPr>
+          <p:cNvPr id="12" name="Picture 11">
+            <a:extLst>
+              <a:ext uri="{FF2B5EF4-FFF2-40B4-BE49-F238E27FC236}">
+                <a16:creationId xmlns:a16="http://schemas.microsoft.com/office/drawing/2014/main" id="{2ED2AD2B-46C7-05DE-D43C-BA0DCACBE7F5}"/>
+              </a:ext>
+            </a:extLst>
+          </p:cNvPr>
+          <p:cNvPicPr>
+            <a:picLocks noChangeAspect="1"/>
+          </p:cNvPicPr>
+          <p:nvPr/>
+        </p:nvPicPr>
+        <p:blipFill rotWithShape="1">
+          <a:blip r:embed="rId3"/>
+          <a:srcRect b="2496"/>
+          <a:stretch/>
+        </p:blipFill>
+        <p:spPr>
+          <a:xfrm>
+            <a:off x="5658296" y="3614478"/>
+            <a:ext cx="5081885" cy="2706071"/>
+          </a:xfrm>
+          <a:prstGeom prst="rect">
+            <a:avLst/>
+          </a:prstGeom>
+          <a:ln>
+            <a:noFill/>
+          </a:ln>
+          <a:effectLst>
+            <a:outerShdw blurRad="190500" algn="tl" rotWithShape="0">
+              <a:srgbClr val="000000">
+                <a:alpha val="70000"/>
+              </a:srgbClr>
+            </a:outerShdw>
+          </a:effectLst>
+        </p:spPr>
+      </p:pic>
       <p:sp>
         <p:nvSpPr>
           <p:cNvPr id="13" name="Title 1">
@@ -9810,46 +9823,6 @@
           </a:p>
         </p:txBody>
       </p:sp>
-      <p:pic>
-        <p:nvPicPr>
-          <p:cNvPr id="5" name="图片 4">
-            <a:extLst>
-              <a:ext uri="{FF2B5EF4-FFF2-40B4-BE49-F238E27FC236}">
-                <a16:creationId xmlns:a16="http://schemas.microsoft.com/office/drawing/2014/main" id="{0A30C4C9-A9F9-A1EF-9C24-F96E6D0B054B}"/>
-              </a:ext>
-            </a:extLst>
-          </p:cNvPr>
-          <p:cNvPicPr>
-            <a:picLocks noChangeAspect="1"/>
-          </p:cNvPicPr>
-          <p:nvPr/>
-        </p:nvPicPr>
-        <p:blipFill>
-          <a:blip r:embed="rId3"/>
-          <a:stretch>
-            <a:fillRect/>
-          </a:stretch>
-        </p:blipFill>
-        <p:spPr>
-          <a:xfrm>
-            <a:off x="5621965" y="3705620"/>
-            <a:ext cx="5162550" cy="2706072"/>
-          </a:xfrm>
-          <a:prstGeom prst="rect">
-            <a:avLst/>
-          </a:prstGeom>
-          <a:ln>
-            <a:noFill/>
-          </a:ln>
-          <a:effectLst>
-            <a:outerShdw blurRad="190500" algn="tl" rotWithShape="0">
-              <a:srgbClr val="000000">
-                <a:alpha val="70000"/>
-              </a:srgbClr>
-            </a:outerShdw>
-          </a:effectLst>
-        </p:spPr>
-      </p:pic>
       <p:sp>
         <p:nvSpPr>
           <p:cNvPr id="14" name="Rectangle 13">
@@ -9864,7 +9837,7 @@
         </p:nvSpPr>
         <p:spPr>
           <a:xfrm>
-            <a:off x="7198800" y="4623306"/>
+            <a:off x="6578599" y="4034910"/>
             <a:ext cx="1774029" cy="1489594"/>
           </a:xfrm>
           <a:prstGeom prst="rect">

</xml_diff>

<commit_message>
fixed eden's ppt update
</commit_message>
<xml_diff>
--- a/Presentation/Final Presentation Online ver.pptx
+++ b/Presentation/Final Presentation Online ver.pptx
@@ -332,7 +332,7 @@
           <a:p>
             <a:fld id="{0D7C75F8-7AE9-9244-A398-42267B2B5DD4}" type="datetimeFigureOut">
               <a:rPr lang="en-US" smtClean="0"/>
-              <a:t>7/20/2022</a:t>
+              <a:t>7/21/2022</a:t>
             </a:fld>
             <a:endParaRPr lang="en-US"/>
           </a:p>
@@ -530,7 +530,7 @@
           <a:p>
             <a:fld id="{0D7C75F8-7AE9-9244-A398-42267B2B5DD4}" type="datetimeFigureOut">
               <a:rPr lang="en-US" smtClean="0"/>
-              <a:t>7/20/2022</a:t>
+              <a:t>7/21/2022</a:t>
             </a:fld>
             <a:endParaRPr lang="en-US"/>
           </a:p>
@@ -738,7 +738,7 @@
           <a:p>
             <a:fld id="{0D7C75F8-7AE9-9244-A398-42267B2B5DD4}" type="datetimeFigureOut">
               <a:rPr lang="en-US" smtClean="0"/>
-              <a:t>7/20/2022</a:t>
+              <a:t>7/21/2022</a:t>
             </a:fld>
             <a:endParaRPr lang="en-US"/>
           </a:p>
@@ -936,7 +936,7 @@
           <a:p>
             <a:fld id="{0D7C75F8-7AE9-9244-A398-42267B2B5DD4}" type="datetimeFigureOut">
               <a:rPr lang="en-US" smtClean="0"/>
-              <a:t>7/20/2022</a:t>
+              <a:t>7/21/2022</a:t>
             </a:fld>
             <a:endParaRPr lang="en-US"/>
           </a:p>
@@ -1211,7 +1211,7 @@
           <a:p>
             <a:fld id="{0D7C75F8-7AE9-9244-A398-42267B2B5DD4}" type="datetimeFigureOut">
               <a:rPr lang="en-US" smtClean="0"/>
-              <a:t>7/20/2022</a:t>
+              <a:t>7/21/2022</a:t>
             </a:fld>
             <a:endParaRPr lang="en-US"/>
           </a:p>
@@ -1476,7 +1476,7 @@
           <a:p>
             <a:fld id="{0D7C75F8-7AE9-9244-A398-42267B2B5DD4}" type="datetimeFigureOut">
               <a:rPr lang="en-US" smtClean="0"/>
-              <a:t>7/20/2022</a:t>
+              <a:t>7/21/2022</a:t>
             </a:fld>
             <a:endParaRPr lang="en-US"/>
           </a:p>
@@ -1888,7 +1888,7 @@
           <a:p>
             <a:fld id="{0D7C75F8-7AE9-9244-A398-42267B2B5DD4}" type="datetimeFigureOut">
               <a:rPr lang="en-US" smtClean="0"/>
-              <a:t>7/20/2022</a:t>
+              <a:t>7/21/2022</a:t>
             </a:fld>
             <a:endParaRPr lang="en-US"/>
           </a:p>
@@ -2029,7 +2029,7 @@
           <a:p>
             <a:fld id="{0D7C75F8-7AE9-9244-A398-42267B2B5DD4}" type="datetimeFigureOut">
               <a:rPr lang="en-US" smtClean="0"/>
-              <a:t>7/20/2022</a:t>
+              <a:t>7/21/2022</a:t>
             </a:fld>
             <a:endParaRPr lang="en-US"/>
           </a:p>
@@ -2142,7 +2142,7 @@
           <a:p>
             <a:fld id="{0D7C75F8-7AE9-9244-A398-42267B2B5DD4}" type="datetimeFigureOut">
               <a:rPr lang="en-US" smtClean="0"/>
-              <a:t>7/20/2022</a:t>
+              <a:t>7/21/2022</a:t>
             </a:fld>
             <a:endParaRPr lang="en-US"/>
           </a:p>
@@ -2453,7 +2453,7 @@
           <a:p>
             <a:fld id="{0D7C75F8-7AE9-9244-A398-42267B2B5DD4}" type="datetimeFigureOut">
               <a:rPr lang="en-US" smtClean="0"/>
-              <a:t>7/20/2022</a:t>
+              <a:t>7/21/2022</a:t>
             </a:fld>
             <a:endParaRPr lang="en-US"/>
           </a:p>
@@ -2741,7 +2741,7 @@
           <a:p>
             <a:fld id="{0D7C75F8-7AE9-9244-A398-42267B2B5DD4}" type="datetimeFigureOut">
               <a:rPr lang="en-US" smtClean="0"/>
-              <a:t>7/20/2022</a:t>
+              <a:t>7/21/2022</a:t>
             </a:fld>
             <a:endParaRPr lang="en-US"/>
           </a:p>
@@ -2982,7 +2982,7 @@
           <a:p>
             <a:fld id="{0D7C75F8-7AE9-9244-A398-42267B2B5DD4}" type="datetimeFigureOut">
               <a:rPr lang="en-US" smtClean="0"/>
-              <a:t>7/20/2022</a:t>
+              <a:t>7/21/2022</a:t>
             </a:fld>
             <a:endParaRPr lang="en-US"/>
           </a:p>
@@ -9685,8 +9685,8 @@
         </p:nvSpPr>
         <p:spPr>
           <a:xfrm>
-            <a:off x="934293" y="2736503"/>
-            <a:ext cx="4412407" cy="1384995"/>
+            <a:off x="576261" y="2480637"/>
+            <a:ext cx="5001370" cy="3108543"/>
           </a:xfrm>
           <a:prstGeom prst="rect">
             <a:avLst/>
@@ -9713,7 +9713,7 @@
             </a:pPr>
             <a:r>
               <a:rPr lang="en-GB" sz="2800" b="1" dirty="0"/>
-              <a:t>You can have 2 Cards</a:t>
+              <a:t>You can have up to 2 Cards, and use any of them at will</a:t>
             </a:r>
           </a:p>
           <a:p>
@@ -9722,51 +9722,38 @@
             </a:pPr>
             <a:r>
               <a:rPr lang="en-US" altLang="zh-CN" sz="2800" b="1" dirty="0"/>
-              <a:t>Collectible card</a:t>
-            </a:r>
-            <a:endParaRPr lang="en-GB" sz="2800" b="1" dirty="0"/>
+              <a:t>A lot of Collectible cards</a:t>
+            </a:r>
+          </a:p>
+          <a:p>
+            <a:endParaRPr lang="en-US" altLang="zh-CN" sz="2800" b="1" dirty="0"/>
+          </a:p>
+          <a:p>
+            <a:r>
+              <a:rPr lang="en-US" altLang="zh-CN" sz="2800" b="1" dirty="0"/>
+              <a:t>Principle:</a:t>
+            </a:r>
+          </a:p>
+          <a:p>
+            <a:r>
+              <a:rPr lang="en-GB" sz="2800" b="1" dirty="0"/>
+              <a:t>Higher </a:t>
+            </a:r>
+            <a:r>
+              <a:rPr lang="en-US" altLang="zh-CN" sz="2800" b="1" dirty="0"/>
+              <a:t>R</a:t>
+            </a:r>
+            <a:r>
+              <a:rPr lang="en-GB" sz="2800" b="1" dirty="0" err="1"/>
+              <a:t>isk</a:t>
+            </a:r>
+            <a:r>
+              <a:rPr lang="en-GB" sz="2800" b="1" dirty="0"/>
+              <a:t> Higher Return</a:t>
+            </a:r>
           </a:p>
         </p:txBody>
       </p:sp>
-      <p:pic>
-        <p:nvPicPr>
-          <p:cNvPr id="12" name="Picture 11">
-            <a:extLst>
-              <a:ext uri="{FF2B5EF4-FFF2-40B4-BE49-F238E27FC236}">
-                <a16:creationId xmlns:a16="http://schemas.microsoft.com/office/drawing/2014/main" id="{2ED2AD2B-46C7-05DE-D43C-BA0DCACBE7F5}"/>
-              </a:ext>
-            </a:extLst>
-          </p:cNvPr>
-          <p:cNvPicPr>
-            <a:picLocks noChangeAspect="1"/>
-          </p:cNvPicPr>
-          <p:nvPr/>
-        </p:nvPicPr>
-        <p:blipFill rotWithShape="1">
-          <a:blip r:embed="rId3"/>
-          <a:srcRect b="2496"/>
-          <a:stretch/>
-        </p:blipFill>
-        <p:spPr>
-          <a:xfrm>
-            <a:off x="5658296" y="3614478"/>
-            <a:ext cx="5081885" cy="2706071"/>
-          </a:xfrm>
-          <a:prstGeom prst="rect">
-            <a:avLst/>
-          </a:prstGeom>
-          <a:ln>
-            <a:noFill/>
-          </a:ln>
-          <a:effectLst>
-            <a:outerShdw blurRad="190500" algn="tl" rotWithShape="0">
-              <a:srgbClr val="000000">
-                <a:alpha val="70000"/>
-              </a:srgbClr>
-            </a:outerShdw>
-          </a:effectLst>
-        </p:spPr>
-      </p:pic>
       <p:sp>
         <p:nvSpPr>
           <p:cNvPr id="13" name="Title 1">
@@ -9823,6 +9810,46 @@
           </a:p>
         </p:txBody>
       </p:sp>
+      <p:pic>
+        <p:nvPicPr>
+          <p:cNvPr id="5" name="图片 4">
+            <a:extLst>
+              <a:ext uri="{FF2B5EF4-FFF2-40B4-BE49-F238E27FC236}">
+                <a16:creationId xmlns:a16="http://schemas.microsoft.com/office/drawing/2014/main" id="{0A30C4C9-A9F9-A1EF-9C24-F96E6D0B054B}"/>
+              </a:ext>
+            </a:extLst>
+          </p:cNvPr>
+          <p:cNvPicPr>
+            <a:picLocks noChangeAspect="1"/>
+          </p:cNvPicPr>
+          <p:nvPr/>
+        </p:nvPicPr>
+        <p:blipFill>
+          <a:blip r:embed="rId3"/>
+          <a:stretch>
+            <a:fillRect/>
+          </a:stretch>
+        </p:blipFill>
+        <p:spPr>
+          <a:xfrm>
+            <a:off x="5621965" y="3705620"/>
+            <a:ext cx="5162550" cy="2706072"/>
+          </a:xfrm>
+          <a:prstGeom prst="rect">
+            <a:avLst/>
+          </a:prstGeom>
+          <a:ln>
+            <a:noFill/>
+          </a:ln>
+          <a:effectLst>
+            <a:outerShdw blurRad="190500" algn="tl" rotWithShape="0">
+              <a:srgbClr val="000000">
+                <a:alpha val="70000"/>
+              </a:srgbClr>
+            </a:outerShdw>
+          </a:effectLst>
+        </p:spPr>
+      </p:pic>
       <p:sp>
         <p:nvSpPr>
           <p:cNvPr id="14" name="Rectangle 13">
@@ -9837,7 +9864,7 @@
         </p:nvSpPr>
         <p:spPr>
           <a:xfrm>
-            <a:off x="6578599" y="4034910"/>
+            <a:off x="7198800" y="4623306"/>
             <a:ext cx="1774029" cy="1489594"/>
           </a:xfrm>
           <a:prstGeom prst="rect">

</xml_diff>